<commit_message>
Update 06.02 Best use of information.pptx
</commit_message>
<xml_diff>
--- a/ch06/06.02 Best use of information.pptx
+++ b/ch06/06.02 Best use of information.pptx
@@ -2996,27 +2996,8 @@
                   </a:schemeClr>
                 </a:solidFill>
               </a:rPr>
-              <a:t>Data can be made more available </a:t>
-            </a:r>
-            <a:r>
-              <a:rPr lang="en-US" sz="4000">
-                <a:solidFill>
-                  <a:schemeClr val="tx1">
-                    <a:lumMod val="85000"/>
-                    <a:lumOff val="15000"/>
-                  </a:schemeClr>
-                </a:solidFill>
-              </a:rPr>
-              <a:t>or useable via the data warehouse</a:t>
-            </a:r>
-            <a:endParaRPr lang="en-US" sz="4000" dirty="0">
-              <a:solidFill>
-                <a:schemeClr val="tx1">
-                  <a:lumMod val="85000"/>
-                  <a:lumOff val="15000"/>
-                </a:schemeClr>
-              </a:solidFill>
-            </a:endParaRPr>
+              <a:t>Data can be made more available or useable via the data warehouse</a:t>
+            </a:r>
           </a:p>
         </p:txBody>
       </p:sp>

</xml_diff>